<commit_message>
minor changes to 2 PowerPoint slides
</commit_message>
<xml_diff>
--- a/PowerPoints/02 - Structure of Compilers.pptx
+++ b/PowerPoints/02 - Structure of Compilers.pptx
@@ -34,7 +34,7 @@
     <p:sldId id="307" r:id="rId22"/>
   </p:sldIdLst>
   <p:sldSz cx="9144000" cy="6858000" type="screen4x3"/>
-  <p:notesSz cx="7010400" cy="9296400"/>
+  <p:notesSz cx="7315200" cy="9601200"/>
   <p:defaultTextStyle>
     <a:defPPr>
       <a:defRPr lang="en-US"/>
@@ -177,12 +177,12 @@
     </p:ext>
     <p:ext uri="{2D200454-40CA-4A62-9FC3-DE9A4176ACB9}">
       <p15:notesGuideLst xmlns:p15="http://schemas.microsoft.com/office/powerpoint/2012/main">
-        <p15:guide id="1" orient="horz" pos="2928">
+        <p15:guide id="1" orient="horz" pos="3024" userDrawn="1">
           <p15:clr>
             <a:srgbClr val="A4A3A4"/>
           </p15:clr>
         </p15:guide>
-        <p15:guide id="2" pos="2208">
+        <p15:guide id="2" pos="2304" userDrawn="1">
           <p15:clr>
             <a:srgbClr val="A4A3A4"/>
           </p15:clr>
@@ -230,8 +230,8 @@
         </p:nvSpPr>
         <p:spPr bwMode="auto">
           <a:xfrm>
-            <a:off x="3971925" y="0"/>
-            <a:ext cx="3038475" cy="465138"/>
+            <a:off x="4144618" y="0"/>
+            <a:ext cx="3170583" cy="480388"/>
           </a:xfrm>
           <a:prstGeom prst="rect">
             <a:avLst/>
@@ -246,7 +246,7 @@
           <a:effectLst/>
         </p:spPr>
         <p:txBody>
-          <a:bodyPr vert="horz" wrap="square" lIns="93172" tIns="46587" rIns="93172" bIns="46587" numCol="1" anchor="t" anchorCtr="0" compatLnSpc="1">
+          <a:bodyPr vert="horz" wrap="square" lIns="96647" tIns="48325" rIns="96647" bIns="48325" numCol="1" anchor="t" anchorCtr="0" compatLnSpc="1">
             <a:prstTxWarp prst="textNoShape">
               <a:avLst/>
             </a:prstTxWarp>
@@ -281,8 +281,8 @@
         </p:nvSpPr>
         <p:spPr bwMode="auto">
           <a:xfrm>
-            <a:off x="3971925" y="8831263"/>
-            <a:ext cx="3038475" cy="465137"/>
+            <a:off x="4144618" y="9120813"/>
+            <a:ext cx="3170583" cy="480387"/>
           </a:xfrm>
           <a:prstGeom prst="rect">
             <a:avLst/>
@@ -297,7 +297,7 @@
           <a:effectLst/>
         </p:spPr>
         <p:txBody>
-          <a:bodyPr vert="horz" wrap="square" lIns="93172" tIns="46587" rIns="93172" bIns="46587" numCol="1" anchor="b" anchorCtr="0" compatLnSpc="1">
+          <a:bodyPr vert="horz" wrap="square" lIns="96647" tIns="48325" rIns="96647" bIns="48325" numCol="1" anchor="b" anchorCtr="0" compatLnSpc="1">
             <a:prstTxWarp prst="textNoShape">
               <a:avLst/>
             </a:prstTxWarp>
@@ -381,7 +381,7 @@
         <p:spPr bwMode="auto">
           <a:xfrm>
             <a:off x="0" y="0"/>
-            <a:ext cx="3038475" cy="465138"/>
+            <a:ext cx="3170583" cy="480388"/>
           </a:xfrm>
           <a:prstGeom prst="rect">
             <a:avLst/>
@@ -396,7 +396,7 @@
           <a:effectLst/>
         </p:spPr>
         <p:txBody>
-          <a:bodyPr vert="horz" wrap="square" lIns="93172" tIns="46587" rIns="93172" bIns="46587" numCol="1" anchor="t" anchorCtr="0" compatLnSpc="1">
+          <a:bodyPr vert="horz" wrap="square" lIns="96647" tIns="48325" rIns="96647" bIns="48325" numCol="1" anchor="t" anchorCtr="0" compatLnSpc="1">
             <a:prstTxWarp prst="textNoShape">
               <a:avLst/>
             </a:prstTxWarp>
@@ -429,8 +429,8 @@
         </p:nvSpPr>
         <p:spPr bwMode="auto">
           <a:xfrm>
-            <a:off x="3971925" y="0"/>
-            <a:ext cx="3038475" cy="465138"/>
+            <a:off x="4144618" y="0"/>
+            <a:ext cx="3170583" cy="480388"/>
           </a:xfrm>
           <a:prstGeom prst="rect">
             <a:avLst/>
@@ -445,7 +445,7 @@
           <a:effectLst/>
         </p:spPr>
         <p:txBody>
-          <a:bodyPr vert="horz" wrap="square" lIns="93172" tIns="46587" rIns="93172" bIns="46587" numCol="1" anchor="t" anchorCtr="0" compatLnSpc="1">
+          <a:bodyPr vert="horz" wrap="square" lIns="96647" tIns="48325" rIns="96647" bIns="48325" numCol="1" anchor="t" anchorCtr="0" compatLnSpc="1">
             <a:prstTxWarp prst="textNoShape">
               <a:avLst/>
             </a:prstTxWarp>
@@ -475,8 +475,8 @@
         </p:nvSpPr>
         <p:spPr bwMode="auto">
           <a:xfrm>
-            <a:off x="1181100" y="696913"/>
-            <a:ext cx="4648200" cy="3486150"/>
+            <a:off x="1257300" y="719138"/>
+            <a:ext cx="4800600" cy="3600450"/>
           </a:xfrm>
           <a:prstGeom prst="rect">
             <a:avLst/>
@@ -504,8 +504,8 @@
         </p:nvSpPr>
         <p:spPr bwMode="auto">
           <a:xfrm>
-            <a:off x="935038" y="4416425"/>
-            <a:ext cx="5140325" cy="4183063"/>
+            <a:off x="975693" y="4561226"/>
+            <a:ext cx="5363817" cy="4320213"/>
           </a:xfrm>
           <a:prstGeom prst="rect">
             <a:avLst/>
@@ -520,7 +520,7 @@
           <a:effectLst/>
         </p:spPr>
         <p:txBody>
-          <a:bodyPr vert="horz" wrap="square" lIns="93172" tIns="46587" rIns="93172" bIns="46587" numCol="1" anchor="t" anchorCtr="0" compatLnSpc="1">
+          <a:bodyPr vert="horz" wrap="square" lIns="96647" tIns="48325" rIns="96647" bIns="48325" numCol="1" anchor="t" anchorCtr="0" compatLnSpc="1">
             <a:prstTxWarp prst="textNoShape">
               <a:avLst/>
             </a:prstTxWarp>
@@ -575,8 +575,8 @@
         </p:nvSpPr>
         <p:spPr bwMode="auto">
           <a:xfrm>
-            <a:off x="0" y="8831263"/>
-            <a:ext cx="3038475" cy="465137"/>
+            <a:off x="0" y="9120813"/>
+            <a:ext cx="3170583" cy="480387"/>
           </a:xfrm>
           <a:prstGeom prst="rect">
             <a:avLst/>
@@ -591,7 +591,7 @@
           <a:effectLst/>
         </p:spPr>
         <p:txBody>
-          <a:bodyPr vert="horz" wrap="square" lIns="93172" tIns="46587" rIns="93172" bIns="46587" numCol="1" anchor="b" anchorCtr="0" compatLnSpc="1">
+          <a:bodyPr vert="horz" wrap="square" lIns="96647" tIns="48325" rIns="96647" bIns="48325" numCol="1" anchor="b" anchorCtr="0" compatLnSpc="1">
             <a:prstTxWarp prst="textNoShape">
               <a:avLst/>
             </a:prstTxWarp>
@@ -621,8 +621,8 @@
         </p:nvSpPr>
         <p:spPr bwMode="auto">
           <a:xfrm>
-            <a:off x="3971925" y="8831263"/>
-            <a:ext cx="3038475" cy="465137"/>
+            <a:off x="4144618" y="9120813"/>
+            <a:ext cx="3170583" cy="480387"/>
           </a:xfrm>
           <a:prstGeom prst="rect">
             <a:avLst/>
@@ -637,7 +637,7 @@
           <a:effectLst/>
         </p:spPr>
         <p:txBody>
-          <a:bodyPr vert="horz" wrap="square" lIns="93172" tIns="46587" rIns="93172" bIns="46587" numCol="1" anchor="b" anchorCtr="0" compatLnSpc="1">
+          <a:bodyPr vert="horz" wrap="square" lIns="96647" tIns="48325" rIns="96647" bIns="48325" numCol="1" anchor="b" anchorCtr="0" compatLnSpc="1">
             <a:prstTxWarp prst="textNoShape">
               <a:avLst/>
             </a:prstTxWarp>
@@ -9300,7 +9300,7 @@
           <a:p>
             <a:r>
               <a:rPr lang="en-US" dirty="0"/>
-              <a:t>Pass 1: Reads/analyzes source text and produces intermediate representation (AST’s)</a:t>
+              <a:t>Pass 1: Reads/analyzes source text and produces intermediate representation (ASTs)</a:t>
             </a:r>
           </a:p>
           <a:p>
@@ -9498,7 +9498,7 @@
           <a:p>
             <a:r>
               <a:rPr lang="en-US" dirty="0"/>
-              <a:t>Reliability (Rule #1: A compiler must be error free.)</a:t>
+              <a:t>Reliability (Goal #1: A compiler must be error free.)</a:t>
             </a:r>
           </a:p>
           <a:p>

</xml_diff>

<commit_message>
minor improvements to two PowerPoint slides
</commit_message>
<xml_diff>
--- a/PowerPoints/02 - Structure of Compilers.pptx
+++ b/PowerPoints/02 - Structure of Compilers.pptx
@@ -7821,7 +7821,7 @@
             </a:pPr>
             <a:r>
               <a:rPr lang="en-US" dirty="0"/>
-              <a:t>Note: Some authors restrict the definition of compiler to a traversal that involves disk I/O, but we will use a more general definition.</a:t>
+              <a:t>Note: Some authors restrict the definition of compiler pass to a traversal that involves disk I/O, but we will use a more general definition.</a:t>
             </a:r>
           </a:p>
           <a:p>
@@ -7983,9 +7983,10 @@
           <a:p>
             <a:pPr lvl="1"/>
             <a:r>
-              <a:rPr lang="en-US" dirty="0"/>
-              <a:t>ideal for multiprocessor systems</a:t>
-            </a:r>
+              <a:rPr lang="en-US"/>
+              <a:t>can exploit concurrency and multiprocessor architectures</a:t>
+            </a:r>
+            <a:endParaRPr lang="en-US" dirty="0"/>
           </a:p>
           <a:p>
             <a:pPr lvl="1"/>

</xml_diff>